<commit_message>
Menambahkan fitur update ppt
</commit_message>
<xml_diff>
--- a/backend/project/PPTX/Cat_presentation.pptx
+++ b/backend/project/PPTX/Cat_presentation.pptx
@@ -3174,7 +3174,7 @@
           <a:lstStyle/>
           <a:p>
             <a:r>
-              <a:t>Slide 9: The Role of Cats in History and Culture</a:t>
+              <a:t>Slide 9: Cats in Art and Literature</a:t>
             </a:r>
           </a:p>
         </p:txBody>
@@ -3196,7 +3196,7 @@
           <a:p>
             <a:r>
               <a:rPr b="1" sz="1800"/>
-              <a:t>Cats have played a significant role in various cultures throughout history. They have been revered as symbols of luck, intelligence, and mystery.</a:t>
+              <a:t>Cats have been a popular subject in art and literature for centuries. From ancient Egyptian hieroglyphics to modern-day internet memes, cats continue to inspire creativity and imagination. Many famous artists and writers have featured cats in their work.</a:t>
             </a:r>
           </a:p>
         </p:txBody>
@@ -3228,7 +3228,7 @@
               <a:defRPr sz="1200"/>
             </a:pPr>
             <a:r>
-              <a:t>- Adams, P. (2012). Cats in Mythology and Folklore. Cat Culture Review, 4(2), 28-36.</a:t>
+              <a:t>- https://www.artsy.net/article/artsy-editorial-art-historian-cats-famously-feline-history-art</a:t>
             </a:r>
           </a:p>
         </p:txBody>
@@ -3289,7 +3289,7 @@
           <a:p>
             <a:r>
               <a:rPr b="1" sz="1800"/>
-              <a:t>Cats are fascinating animals that have captured the hearts of millions of people around the world. Whether as pets or as symbols of cultural significance, cats continue to hold a special place in our lives.</a:t>
+              <a:t>Cats are fascinating creatures with a long history of companionship with humans. Whether as pets, symbols of luck, or characters in stories, cats continue to hold a special place in our hearts. By understanding their behavior, health needs, and unique traits, we can build strong bonds with our feline friends.</a:t>
             </a:r>
           </a:p>
         </p:txBody>
@@ -3321,7 +3321,7 @@
               <a:defRPr sz="1200"/>
             </a:pPr>
             <a:r>
-              <a:t>- Johnson, S. (2021). The Cat Phenomenon. Cat World Today, 9(1), 5-10.</a:t>
+              <a:t>- https://www.animalwised.com/history-and-origin-of-the-domestic-cat-3609.html</a:t>
             </a:r>
           </a:p>
         </p:txBody>
@@ -3382,7 +3382,7 @@
           <a:p>
             <a:r>
               <a:rPr b="1" sz="1800"/>
-              <a:t>Cats are domesticated animals that are popular as pets. They are known for their independence and agility. Cats have been domesticated for thousands of years.</a:t>
+              <a:t>Cats are small carnivorous mammals that are often kept as house pets. They are known for their agility, independent nature, and ability to hunt rodents. There are many different breeds of cats, each with their own unique characteristics and personalities.</a:t>
             </a:r>
           </a:p>
         </p:txBody>
@@ -3414,7 +3414,7 @@
               <a:defRPr sz="1200"/>
             </a:pPr>
             <a:r>
-              <a:t>- Smith, J. (2020). The History of Cats. Cat Fancy Journal, 10(2), 45-58.</a:t>
+              <a:t>- https://en.wikipedia.org/wiki/Cat</a:t>
             </a:r>
           </a:p>
         </p:txBody>
@@ -3453,7 +3453,7 @@
           <a:lstStyle/>
           <a:p>
             <a:r>
-              <a:t>Slide 2: Types of Cats</a:t>
+              <a:t>Slide 2: History of Domestic Cats</a:t>
             </a:r>
           </a:p>
         </p:txBody>
@@ -3475,7 +3475,7 @@
           <a:p>
             <a:r>
               <a:rPr b="1" sz="1800"/>
-              <a:t>There are many different breeds of cats, each with its own unique characteristics. Some popular cat breeds include Persian, Siamese, and Maine Coon.</a:t>
+              <a:t>Cats have been domesticated for thousands of years and have played various roles in human society. They were first domesticated in the Near East around 7500 BC and have since spread to all corners of the globe. Today, cats are one of the most popular pets in the world.</a:t>
             </a:r>
           </a:p>
         </p:txBody>
@@ -3507,7 +3507,7 @@
               <a:defRPr sz="1200"/>
             </a:pPr>
             <a:r>
-              <a:t>- Brown, L. (2019). Cat Breeds: A Comprehensive Guide. Cat World Magazine, 5(3), 22-30.</a:t>
+              <a:t>- https://www.nationalgeographic.com/animals/mammals/d/domestic-cat/</a:t>
             </a:r>
           </a:p>
         </p:txBody>
@@ -3546,7 +3546,7 @@
           <a:lstStyle/>
           <a:p>
             <a:r>
-              <a:t>Slide 3: Cat Behavior</a:t>
+              <a:t>Slide 3: Physical Characteristics of Cats</a:t>
             </a:r>
           </a:p>
         </p:txBody>
@@ -3568,7 +3568,7 @@
           <a:p>
             <a:r>
               <a:rPr b="1" sz="1800"/>
-              <a:t>Cats are known for their curiosity and playful nature. They also have a strong sense of territory and may exhibit aggression towards unfamiliar cats.</a:t>
+              <a:t>Cats have a flexible body, sharp retractable claws, strong jaws, and excellent vision and hearing. They are known for their retractable claws that they use for hunting and climbing. Cats also have a keen sense of smell and can see well in low light.</a:t>
             </a:r>
           </a:p>
         </p:txBody>
@@ -3600,7 +3600,7 @@
               <a:defRPr sz="1200"/>
             </a:pPr>
             <a:r>
-              <a:t>- Jones, S. (2018). Understanding Cat Behavior. Cat Behavior Quarterly, 8(4), 12-18.</a:t>
+              <a:t>- https://www.thesprucepets.com/cat-breeds-4176798</a:t>
             </a:r>
           </a:p>
         </p:txBody>
@@ -3639,7 +3639,7 @@
           <a:lstStyle/>
           <a:p>
             <a:r>
-              <a:t>Slide 4: Cat Care and Nutrition</a:t>
+              <a:t>Slide 4: Cat Behavior and Communication</a:t>
             </a:r>
           </a:p>
         </p:txBody>
@@ -3661,7 +3661,7 @@
           <a:p>
             <a:r>
               <a:rPr b="1" sz="1800"/>
-              <a:t>Proper care and nutrition are essential for keeping cats healthy. Cats require a balanced diet, regular grooming, and veterinary care.</a:t>
+              <a:t>Cats communicate through a combination of vocalizations, body language, and scent marking. They can purr when content, meow when hungry or seeking attention, and hiss or growl when threatened. Understanding cat behavior is important for creating a strong bond with your feline friend.</a:t>
             </a:r>
           </a:p>
         </p:txBody>
@@ -3693,7 +3693,7 @@
               <a:defRPr sz="1200"/>
             </a:pPr>
             <a:r>
-              <a:t>- White, M. (2017). The Complete Guide to Cat Care. Cat Health Today, 3(1), 30-42.</a:t>
+              <a:t>- https://icatcare.org/advice/cat-behaviour/</a:t>
             </a:r>
           </a:p>
         </p:txBody>
@@ -3732,7 +3732,7 @@
           <a:lstStyle/>
           <a:p>
             <a:r>
-              <a:t>Slide 5: The Social Behavior of Cats</a:t>
+              <a:t>Slide 5: Health and Care of Cats</a:t>
             </a:r>
           </a:p>
         </p:txBody>
@@ -3754,7 +3754,7 @@
           <a:p>
             <a:r>
               <a:rPr b="1" sz="1800"/>
-              <a:t>Despite their independent nature, cats are social animals that form strong bonds with their human companions. They may also establish hierarchies with other cats.</a:t>
+              <a:t>Cats require regular grooming, vaccinations, and veterinary check-ups to ensure they stay healthy. It's important to provide them with a balanced diet, fresh water, and a safe environment. Proper care can help prevent common health issues in cats.</a:t>
             </a:r>
           </a:p>
         </p:txBody>
@@ -3786,7 +3786,7 @@
               <a:defRPr sz="1200"/>
             </a:pPr>
             <a:r>
-              <a:t>- Johnson, K. (2016). The Social Lives of Cats. Cat Behavior Review, 7(2), 55-68.</a:t>
+              <a:t>- https://pets.webmd.com/cats/guide/caring-for-a-cat</a:t>
             </a:r>
           </a:p>
         </p:txBody>
@@ -3825,7 +3825,7 @@
           <a:lstStyle/>
           <a:p>
             <a:r>
-              <a:t>Slide 6: Cat Communication</a:t>
+              <a:t>Slide 6: Common Breeds of Cats</a:t>
             </a:r>
           </a:p>
         </p:txBody>
@@ -3847,7 +3847,7 @@
           <a:p>
             <a:r>
               <a:rPr b="1" sz="1800"/>
-              <a:t>Cats communicate through a combination of vocalization, body language, and scent marking. Understanding these cues can help in building a strong bond with your cat.</a:t>
+              <a:t>There are over 70 recognized cat breeds, each with its own unique characteristics and personality traits. Some popular breeds include the Siamese, Persian, Maine Coon, and Bengal. Different breeds have different grooming and care requirements.</a:t>
             </a:r>
           </a:p>
         </p:txBody>
@@ -3879,7 +3879,7 @@
               <a:defRPr sz="1200"/>
             </a:pPr>
             <a:r>
-              <a:t>- Garcia, A. (2015). Decoding Cat Communication. Cat Communication Journal, 6(3), 40-48.</a:t>
+              <a:t>- https://cattime.com/cat-breeds</a:t>
             </a:r>
           </a:p>
         </p:txBody>
@@ -3918,7 +3918,7 @@
           <a:lstStyle/>
           <a:p>
             <a:r>
-              <a:t>Slide 7: Common Health Issues in Cats</a:t>
+              <a:t>Slide 7: Famous Cats in History and Pop Culture</a:t>
             </a:r>
           </a:p>
         </p:txBody>
@@ -3940,7 +3940,7 @@
           <a:p>
             <a:r>
               <a:rPr b="1" sz="1800"/>
-              <a:t>Cats are prone to various health issues such as obesity, dental problems, and urinary tract infections. Regular veterinary check-ups are important for early detection and treatment.</a:t>
+              <a:t>Cats have played important roles in history and pop culture. From ancient Egyptian worship of cats to famous fictional felines like Garfield and Hello Kitty, cats have captured the hearts of people around the world.</a:t>
             </a:r>
           </a:p>
         </p:txBody>
@@ -3972,7 +3972,7 @@
               <a:defRPr sz="1200"/>
             </a:pPr>
             <a:r>
-              <a:t>- Martinez, R. (2014). Preventing Common Health Issues in Cats. Cat Health Quarterly, 5(4), 75-82.</a:t>
+              <a:t>- https://www.history.com/news/a-history-of-house-cats</a:t>
             </a:r>
           </a:p>
         </p:txBody>
@@ -4011,7 +4011,7 @@
           <a:lstStyle/>
           <a:p>
             <a:r>
-              <a:t>Slide 8: Fun Facts about Cats</a:t>
+              <a:t>Slide 8: Cat Myths and Superstitions</a:t>
             </a:r>
           </a:p>
         </p:txBody>
@@ -4033,7 +4033,7 @@
           <a:p>
             <a:r>
               <a:rPr b="1" sz="1800"/>
-              <a:t>Did you know that cats have a strong sense of smell and excellent night vision? They are also known for their grooming habits and ability to land on their feet.</a:t>
+              <a:t>Cats have been associated with various myths and superstitions throughout history. In many cultures, black cats are considered bad luck, while in others, they are seen as symbols of good fortune. Understanding these myths can help dispel common misconceptions about cats.</a:t>
             </a:r>
           </a:p>
         </p:txBody>
@@ -4065,7 +4065,7 @@
               <a:defRPr sz="1200"/>
             </a:pPr>
             <a:r>
-              <a:t>- Taylor, D. (2013). The Fascinating World of Cats. Cat Facts Monthly, 2(6), 15-20.</a:t>
+              <a:t>- https://www.livescience.com/35041-black-cat-taboo-life-balance-spooky-110713.html</a:t>
             </a:r>
           </a:p>
         </p:txBody>

</xml_diff>